<commit_message>
Add new Intergrations and Refinements
</commit_message>
<xml_diff>
--- a/Design/Libertas.pptx
+++ b/Design/Libertas.pptx
@@ -268,7 +268,7 @@
           <a:p>
             <a:fld id="{D4522698-FCA6-49C4-B2D5-FAB6DCB80E2E}" type="datetimeFigureOut">
               <a:rPr lang="en-US" smtClean="0"/>
-              <a:t>7/30/2020</a:t>
+              <a:t>7/31/2020</a:t>
             </a:fld>
             <a:endParaRPr lang="en-US"/>
           </a:p>
@@ -466,7 +466,7 @@
           <a:p>
             <a:fld id="{D4522698-FCA6-49C4-B2D5-FAB6DCB80E2E}" type="datetimeFigureOut">
               <a:rPr lang="en-US" smtClean="0"/>
-              <a:t>7/30/2020</a:t>
+              <a:t>7/31/2020</a:t>
             </a:fld>
             <a:endParaRPr lang="en-US"/>
           </a:p>
@@ -674,7 +674,7 @@
           <a:p>
             <a:fld id="{D4522698-FCA6-49C4-B2D5-FAB6DCB80E2E}" type="datetimeFigureOut">
               <a:rPr lang="en-US" smtClean="0"/>
-              <a:t>7/30/2020</a:t>
+              <a:t>7/31/2020</a:t>
             </a:fld>
             <a:endParaRPr lang="en-US"/>
           </a:p>
@@ -872,7 +872,7 @@
           <a:p>
             <a:fld id="{D4522698-FCA6-49C4-B2D5-FAB6DCB80E2E}" type="datetimeFigureOut">
               <a:rPr lang="en-US" smtClean="0"/>
-              <a:t>7/30/2020</a:t>
+              <a:t>7/31/2020</a:t>
             </a:fld>
             <a:endParaRPr lang="en-US"/>
           </a:p>
@@ -1147,7 +1147,7 @@
           <a:p>
             <a:fld id="{D4522698-FCA6-49C4-B2D5-FAB6DCB80E2E}" type="datetimeFigureOut">
               <a:rPr lang="en-US" smtClean="0"/>
-              <a:t>7/30/2020</a:t>
+              <a:t>7/31/2020</a:t>
             </a:fld>
             <a:endParaRPr lang="en-US"/>
           </a:p>
@@ -1412,7 +1412,7 @@
           <a:p>
             <a:fld id="{D4522698-FCA6-49C4-B2D5-FAB6DCB80E2E}" type="datetimeFigureOut">
               <a:rPr lang="en-US" smtClean="0"/>
-              <a:t>7/30/2020</a:t>
+              <a:t>7/31/2020</a:t>
             </a:fld>
             <a:endParaRPr lang="en-US"/>
           </a:p>
@@ -1824,7 +1824,7 @@
           <a:p>
             <a:fld id="{D4522698-FCA6-49C4-B2D5-FAB6DCB80E2E}" type="datetimeFigureOut">
               <a:rPr lang="en-US" smtClean="0"/>
-              <a:t>7/30/2020</a:t>
+              <a:t>7/31/2020</a:t>
             </a:fld>
             <a:endParaRPr lang="en-US"/>
           </a:p>
@@ -1965,7 +1965,7 @@
           <a:p>
             <a:fld id="{D4522698-FCA6-49C4-B2D5-FAB6DCB80E2E}" type="datetimeFigureOut">
               <a:rPr lang="en-US" smtClean="0"/>
-              <a:t>7/30/2020</a:t>
+              <a:t>7/31/2020</a:t>
             </a:fld>
             <a:endParaRPr lang="en-US"/>
           </a:p>
@@ -2078,7 +2078,7 @@
           <a:p>
             <a:fld id="{D4522698-FCA6-49C4-B2D5-FAB6DCB80E2E}" type="datetimeFigureOut">
               <a:rPr lang="en-US" smtClean="0"/>
-              <a:t>7/30/2020</a:t>
+              <a:t>7/31/2020</a:t>
             </a:fld>
             <a:endParaRPr lang="en-US"/>
           </a:p>
@@ -2389,7 +2389,7 @@
           <a:p>
             <a:fld id="{D4522698-FCA6-49C4-B2D5-FAB6DCB80E2E}" type="datetimeFigureOut">
               <a:rPr lang="en-US" smtClean="0"/>
-              <a:t>7/30/2020</a:t>
+              <a:t>7/31/2020</a:t>
             </a:fld>
             <a:endParaRPr lang="en-US"/>
           </a:p>
@@ -2677,7 +2677,7 @@
           <a:p>
             <a:fld id="{D4522698-FCA6-49C4-B2D5-FAB6DCB80E2E}" type="datetimeFigureOut">
               <a:rPr lang="en-US" smtClean="0"/>
-              <a:t>7/30/2020</a:t>
+              <a:t>7/31/2020</a:t>
             </a:fld>
             <a:endParaRPr lang="en-US"/>
           </a:p>
@@ -2918,7 +2918,7 @@
           <a:p>
             <a:fld id="{D4522698-FCA6-49C4-B2D5-FAB6DCB80E2E}" type="datetimeFigureOut">
               <a:rPr lang="en-US" smtClean="0"/>
-              <a:t>7/30/2020</a:t>
+              <a:t>7/31/2020</a:t>
             </a:fld>
             <a:endParaRPr lang="en-US"/>
           </a:p>
@@ -3879,7 +3879,7 @@
         </p:nvGrpSpPr>
         <p:grpSpPr>
           <a:xfrm>
-            <a:off x="641442" y="3232821"/>
+            <a:off x="645296" y="3086397"/>
             <a:ext cx="3530793" cy="923330"/>
             <a:chOff x="603867" y="3051208"/>
             <a:chExt cx="3530793" cy="923330"/>
@@ -4130,7 +4130,7 @@
         </p:nvGrpSpPr>
         <p:grpSpPr>
           <a:xfrm>
-            <a:off x="631104" y="4416741"/>
+            <a:off x="631104" y="4241317"/>
             <a:ext cx="3564249" cy="923330"/>
             <a:chOff x="612205" y="4182789"/>
             <a:chExt cx="3564249" cy="923330"/>
@@ -4381,7 +4381,7 @@
         </p:nvGrpSpPr>
         <p:grpSpPr>
           <a:xfrm>
-            <a:off x="4317183" y="3231609"/>
+            <a:off x="4321037" y="3085185"/>
             <a:ext cx="3678659" cy="923330"/>
             <a:chOff x="620543" y="5252779"/>
             <a:chExt cx="3678659" cy="923330"/>
@@ -4668,7 +4668,7 @@
         </p:nvGrpSpPr>
         <p:grpSpPr>
           <a:xfrm>
-            <a:off x="4325521" y="4418935"/>
+            <a:off x="4325521" y="4243511"/>
             <a:ext cx="4188751" cy="923330"/>
             <a:chOff x="620543" y="5252779"/>
             <a:chExt cx="4188751" cy="923330"/>
@@ -4919,10 +4919,10 @@
         </p:nvGrpSpPr>
         <p:grpSpPr>
           <a:xfrm>
-            <a:off x="1969703" y="5704901"/>
-            <a:ext cx="5530372" cy="657590"/>
-            <a:chOff x="620543" y="5385649"/>
-            <a:chExt cx="5530372" cy="657590"/>
+            <a:off x="631104" y="5446369"/>
+            <a:ext cx="3702757" cy="830997"/>
+            <a:chOff x="620543" y="5268738"/>
+            <a:chExt cx="3619642" cy="830997"/>
           </a:xfrm>
         </p:grpSpPr>
         <p:sp>
@@ -4945,15 +4945,15 @@
             <a:custGeom>
               <a:avLst/>
               <a:gdLst>
-                <a:gd name="connsiteX0" fmla="*/ 0 w 657590"/>
+                <a:gd name="connsiteX0" fmla="*/ 0 w 672690"/>
                 <a:gd name="connsiteY0" fmla="*/ 328795 h 657590"/>
-                <a:gd name="connsiteX1" fmla="*/ 328795 w 657590"/>
+                <a:gd name="connsiteX1" fmla="*/ 336345 w 672690"/>
                 <a:gd name="connsiteY1" fmla="*/ 0 h 657590"/>
-                <a:gd name="connsiteX2" fmla="*/ 657590 w 657590"/>
+                <a:gd name="connsiteX2" fmla="*/ 672690 w 672690"/>
                 <a:gd name="connsiteY2" fmla="*/ 328795 h 657590"/>
-                <a:gd name="connsiteX3" fmla="*/ 328795 w 657590"/>
+                <a:gd name="connsiteX3" fmla="*/ 336345 w 672690"/>
                 <a:gd name="connsiteY3" fmla="*/ 657590 h 657590"/>
-                <a:gd name="connsiteX4" fmla="*/ 0 w 657590"/>
+                <a:gd name="connsiteX4" fmla="*/ 0 w 672690"/>
                 <a:gd name="connsiteY4" fmla="*/ 328795 h 657590"/>
               </a:gdLst>
               <a:ahLst/>
@@ -4976,27 +4976,27 @@
               </a:cxnLst>
               <a:rect l="l" t="t" r="r" b="b"/>
               <a:pathLst>
-                <a:path w="657590" h="657590" extrusionOk="0">
+                <a:path w="672690" h="657590" extrusionOk="0">
                   <a:moveTo>
                     <a:pt x="0" y="328795"/>
                   </a:moveTo>
                   <a:cubicBezTo>
-                    <a:pt x="-7641" y="125846"/>
-                    <a:pt x="143790" y="-41470"/>
-                    <a:pt x="328795" y="0"/>
+                    <a:pt x="-13648" y="109053"/>
+                    <a:pt x="149945" y="-7796"/>
+                    <a:pt x="336345" y="0"/>
                   </a:cubicBezTo>
                   <a:cubicBezTo>
-                    <a:pt x="501725" y="-2097"/>
-                    <a:pt x="615009" y="155227"/>
-                    <a:pt x="657590" y="328795"/>
+                    <a:pt x="513445" y="-2097"/>
+                    <a:pt x="630109" y="155227"/>
+                    <a:pt x="672690" y="328795"/>
                   </a:cubicBezTo>
                   <a:cubicBezTo>
-                    <a:pt x="666321" y="528854"/>
-                    <a:pt x="530820" y="649100"/>
-                    <a:pt x="328795" y="657590"/>
+                    <a:pt x="686990" y="540636"/>
+                    <a:pt x="543229" y="648814"/>
+                    <a:pt x="336345" y="657590"/>
                   </a:cubicBezTo>
                   <a:cubicBezTo>
-                    <a:pt x="187854" y="659513"/>
+                    <a:pt x="191234" y="659513"/>
                     <a:pt x="852" y="520122"/>
                     <a:pt x="0" y="328795"/>
                   </a:cubicBezTo>
@@ -5121,8 +5121,361 @@
           </p:nvSpPr>
           <p:spPr>
             <a:xfrm>
-              <a:off x="1444776" y="5396908"/>
-              <a:ext cx="4706139" cy="646331"/>
+              <a:off x="1332077" y="5268738"/>
+              <a:ext cx="2908108" cy="830997"/>
+            </a:xfrm>
+            <a:prstGeom prst="rect">
+              <a:avLst/>
+            </a:prstGeom>
+            <a:noFill/>
+            <a:effectLst/>
+          </p:spPr>
+          <p:txBody>
+            <a:bodyPr wrap="square" rtlCol="0">
+              <a:spAutoFit/>
+            </a:bodyPr>
+            <a:lstStyle/>
+            <a:p>
+              <a:r>
+                <a:rPr lang="en-US" sz="1600" b="1" dirty="0">
+                  <a:solidFill>
+                    <a:schemeClr val="bg1"/>
+                  </a:solidFill>
+                  <a:effectLst>
+                    <a:glow rad="63500">
+                      <a:schemeClr val="bg1">
+                        <a:alpha val="16000"/>
+                      </a:schemeClr>
+                    </a:glow>
+                  </a:effectLst>
+                  <a:latin typeface="Montserrat" panose="00000500000000000000" pitchFamily="50" charset="0"/>
+                </a:rPr>
+                <a:t>Stream money directly to your creators, monetizing every second.</a:t>
+              </a:r>
+            </a:p>
+          </p:txBody>
+        </p:sp>
+      </p:grpSp>
+      <p:pic>
+        <p:nvPicPr>
+          <p:cNvPr id="19" name="Picture 18">
+            <a:extLst>
+              <a:ext uri="{FF2B5EF4-FFF2-40B4-BE49-F238E27FC236}">
+                <a16:creationId xmlns:a16="http://schemas.microsoft.com/office/drawing/2014/main" id="{EDB8BCE2-B0A9-4E06-97DD-B577B41E9853}"/>
+              </a:ext>
+            </a:extLst>
+          </p:cNvPr>
+          <p:cNvPicPr>
+            <a:picLocks noChangeAspect="1"/>
+          </p:cNvPicPr>
+          <p:nvPr/>
+        </p:nvPicPr>
+        <p:blipFill rotWithShape="1">
+          <a:blip r:embed="rId8"/>
+          <a:srcRect l="7141" t="24039" r="7909" b="13810"/>
+          <a:stretch/>
+        </p:blipFill>
+        <p:spPr>
+          <a:xfrm>
+            <a:off x="8103537" y="4089869"/>
+            <a:ext cx="4010412" cy="2849768"/>
+          </a:xfrm>
+          <a:prstGeom prst="rect">
+            <a:avLst/>
+          </a:prstGeom>
+        </p:spPr>
+      </p:pic>
+      <p:pic>
+        <p:nvPicPr>
+          <p:cNvPr id="21" name="Picture 20" descr="A picture containing drawing&#10;&#10;Description automatically generated">
+            <a:extLst>
+              <a:ext uri="{FF2B5EF4-FFF2-40B4-BE49-F238E27FC236}">
+                <a16:creationId xmlns:a16="http://schemas.microsoft.com/office/drawing/2014/main" id="{5060EB76-3703-412E-96FD-ADC9CCCD7558}"/>
+              </a:ext>
+            </a:extLst>
+          </p:cNvPr>
+          <p:cNvPicPr>
+            <a:picLocks noChangeAspect="1"/>
+          </p:cNvPicPr>
+          <p:nvPr/>
+        </p:nvPicPr>
+        <p:blipFill>
+          <a:blip r:embed="rId9">
+            <a:extLst>
+              <a:ext uri="{28A0092B-C50C-407E-A947-70E740481C1C}">
+                <a14:useLocalDpi xmlns:a14="http://schemas.microsoft.com/office/drawing/2010/main" val="0"/>
+              </a:ext>
+            </a:extLst>
+          </a:blip>
+          <a:stretch>
+            <a:fillRect/>
+          </a:stretch>
+        </p:blipFill>
+        <p:spPr>
+          <a:xfrm>
+            <a:off x="672689" y="334732"/>
+            <a:ext cx="538215" cy="538215"/>
+          </a:xfrm>
+          <a:prstGeom prst="rect">
+            <a:avLst/>
+          </a:prstGeom>
+        </p:spPr>
+      </p:pic>
+      <p:pic>
+        <p:nvPicPr>
+          <p:cNvPr id="22" name="Picture 21" descr="A picture containing drawing&#10;&#10;Description automatically generated">
+            <a:extLst>
+              <a:ext uri="{FF2B5EF4-FFF2-40B4-BE49-F238E27FC236}">
+                <a16:creationId xmlns:a16="http://schemas.microsoft.com/office/drawing/2014/main" id="{207F00AE-E537-46D2-B79B-2B5CEE13CA49}"/>
+              </a:ext>
+            </a:extLst>
+          </p:cNvPr>
+          <p:cNvPicPr>
+            <a:picLocks noChangeAspect="1"/>
+          </p:cNvPicPr>
+          <p:nvPr/>
+        </p:nvPicPr>
+        <p:blipFill>
+          <a:blip r:embed="rId9">
+            <a:alphaModFix amt="5000"/>
+            <a:extLst>
+              <a:ext uri="{28A0092B-C50C-407E-A947-70E740481C1C}">
+                <a14:useLocalDpi xmlns:a14="http://schemas.microsoft.com/office/drawing/2010/main" val="0"/>
+              </a:ext>
+            </a:extLst>
+          </a:blip>
+          <a:stretch>
+            <a:fillRect/>
+          </a:stretch>
+        </p:blipFill>
+        <p:spPr>
+          <a:xfrm>
+            <a:off x="21665" y="-409807"/>
+            <a:ext cx="2188938" cy="2188938"/>
+          </a:xfrm>
+          <a:prstGeom prst="rect">
+            <a:avLst/>
+          </a:prstGeom>
+        </p:spPr>
+      </p:pic>
+      <p:grpSp>
+        <p:nvGrpSpPr>
+          <p:cNvPr id="36" name="Group 35">
+            <a:extLst>
+              <a:ext uri="{FF2B5EF4-FFF2-40B4-BE49-F238E27FC236}">
+                <a16:creationId xmlns:a16="http://schemas.microsoft.com/office/drawing/2014/main" id="{F0C976D9-B534-4403-92AF-24F6E27475DD}"/>
+              </a:ext>
+            </a:extLst>
+          </p:cNvPr>
+          <p:cNvGrpSpPr/>
+          <p:nvPr/>
+        </p:nvGrpSpPr>
+        <p:grpSpPr>
+          <a:xfrm>
+            <a:off x="4368609" y="5400202"/>
+            <a:ext cx="4188751" cy="923330"/>
+            <a:chOff x="620543" y="5252779"/>
+            <a:chExt cx="4188751" cy="923330"/>
+          </a:xfrm>
+        </p:grpSpPr>
+        <p:sp>
+          <p:nvSpPr>
+            <p:cNvPr id="37" name="Oval 36">
+              <a:extLst>
+                <a:ext uri="{FF2B5EF4-FFF2-40B4-BE49-F238E27FC236}">
+                  <a16:creationId xmlns:a16="http://schemas.microsoft.com/office/drawing/2014/main" id="{774E6DF3-18F4-4053-AB90-81919D0F5C13}"/>
+                </a:ext>
+              </a:extLst>
+            </p:cNvPr>
+            <p:cNvSpPr/>
+            <p:nvPr/>
+          </p:nvSpPr>
+          <p:spPr>
+            <a:xfrm>
+              <a:off x="620543" y="5385649"/>
+              <a:ext cx="657590" cy="657590"/>
+            </a:xfrm>
+            <a:custGeom>
+              <a:avLst/>
+              <a:gdLst>
+                <a:gd name="connsiteX0" fmla="*/ 0 w 657590"/>
+                <a:gd name="connsiteY0" fmla="*/ 328795 h 657590"/>
+                <a:gd name="connsiteX1" fmla="*/ 328795 w 657590"/>
+                <a:gd name="connsiteY1" fmla="*/ 0 h 657590"/>
+                <a:gd name="connsiteX2" fmla="*/ 657590 w 657590"/>
+                <a:gd name="connsiteY2" fmla="*/ 328795 h 657590"/>
+                <a:gd name="connsiteX3" fmla="*/ 328795 w 657590"/>
+                <a:gd name="connsiteY3" fmla="*/ 657590 h 657590"/>
+                <a:gd name="connsiteX4" fmla="*/ 0 w 657590"/>
+                <a:gd name="connsiteY4" fmla="*/ 328795 h 657590"/>
+              </a:gdLst>
+              <a:ahLst/>
+              <a:cxnLst>
+                <a:cxn ang="0">
+                  <a:pos x="connsiteX0" y="connsiteY0"/>
+                </a:cxn>
+                <a:cxn ang="0">
+                  <a:pos x="connsiteX1" y="connsiteY1"/>
+                </a:cxn>
+                <a:cxn ang="0">
+                  <a:pos x="connsiteX2" y="connsiteY2"/>
+                </a:cxn>
+                <a:cxn ang="0">
+                  <a:pos x="connsiteX3" y="connsiteY3"/>
+                </a:cxn>
+                <a:cxn ang="0">
+                  <a:pos x="connsiteX4" y="connsiteY4"/>
+                </a:cxn>
+              </a:cxnLst>
+              <a:rect l="l" t="t" r="r" b="b"/>
+              <a:pathLst>
+                <a:path w="657590" h="657590" extrusionOk="0">
+                  <a:moveTo>
+                    <a:pt x="0" y="328795"/>
+                  </a:moveTo>
+                  <a:cubicBezTo>
+                    <a:pt x="-7641" y="125846"/>
+                    <a:pt x="143790" y="-41470"/>
+                    <a:pt x="328795" y="0"/>
+                  </a:cubicBezTo>
+                  <a:cubicBezTo>
+                    <a:pt x="501725" y="-2097"/>
+                    <a:pt x="615009" y="155227"/>
+                    <a:pt x="657590" y="328795"/>
+                  </a:cubicBezTo>
+                  <a:cubicBezTo>
+                    <a:pt x="666321" y="528854"/>
+                    <a:pt x="530820" y="649100"/>
+                    <a:pt x="328795" y="657590"/>
+                  </a:cubicBezTo>
+                  <a:cubicBezTo>
+                    <a:pt x="187854" y="659513"/>
+                    <a:pt x="852" y="520122"/>
+                    <a:pt x="0" y="328795"/>
+                  </a:cubicBezTo>
+                  <a:close/>
+                </a:path>
+              </a:pathLst>
+            </a:custGeom>
+            <a:noFill/>
+            <a:ln>
+              <a:solidFill>
+                <a:schemeClr val="bg1"/>
+              </a:solidFill>
+              <a:extLst>
+                <a:ext uri="{C807C97D-BFC1-408E-A445-0C87EB9F89A2}">
+                  <ask:lineSketchStyleProps xmlns:ask="http://schemas.microsoft.com/office/drawing/2018/sketchyshapes" sd="264327539">
+                    <a:prstGeom prst="ellipse">
+                      <a:avLst/>
+                    </a:prstGeom>
+                    <ask:type>
+                      <ask:lineSketchFreehand/>
+                    </ask:type>
+                  </ask:lineSketchStyleProps>
+                </a:ext>
+              </a:extLst>
+            </a:ln>
+          </p:spPr>
+          <p:style>
+            <a:lnRef idx="2">
+              <a:schemeClr val="accent1">
+                <a:shade val="50000"/>
+              </a:schemeClr>
+            </a:lnRef>
+            <a:fillRef idx="1">
+              <a:schemeClr val="accent1"/>
+            </a:fillRef>
+            <a:effectRef idx="0">
+              <a:schemeClr val="accent1"/>
+            </a:effectRef>
+            <a:fontRef idx="minor">
+              <a:schemeClr val="lt1"/>
+            </a:fontRef>
+          </p:style>
+          <p:txBody>
+            <a:bodyPr rtlCol="0" anchor="ctr"/>
+            <a:lstStyle/>
+            <a:p>
+              <a:pPr algn="ctr"/>
+              <a:endParaRPr lang="en-US"/>
+            </a:p>
+          </p:txBody>
+        </p:sp>
+        <p:sp>
+          <p:nvSpPr>
+            <p:cNvPr id="38" name="TextBox 37">
+              <a:extLst>
+                <a:ext uri="{FF2B5EF4-FFF2-40B4-BE49-F238E27FC236}">
+                  <a16:creationId xmlns:a16="http://schemas.microsoft.com/office/drawing/2014/main" id="{F0FD4111-1CA8-4062-8111-C2E5E2DBFFFC}"/>
+                </a:ext>
+              </a:extLst>
+            </p:cNvPr>
+            <p:cNvSpPr txBox="1"/>
+            <p:nvPr/>
+          </p:nvSpPr>
+          <p:spPr>
+            <a:xfrm>
+              <a:off x="628881" y="5529778"/>
+              <a:ext cx="649252" cy="369332"/>
+            </a:xfrm>
+            <a:prstGeom prst="rect">
+              <a:avLst/>
+            </a:prstGeom>
+            <a:noFill/>
+            <a:effectLst/>
+          </p:spPr>
+          <p:txBody>
+            <a:bodyPr wrap="square">
+              <a:spAutoFit/>
+            </a:bodyPr>
+            <a:lstStyle/>
+            <a:p>
+              <a:pPr algn="ctr"/>
+              <a:r>
+                <a:rPr lang="en-US" b="1" spc="300" dirty="0">
+                  <a:solidFill>
+                    <a:schemeClr val="bg1"/>
+                  </a:solidFill>
+                  <a:effectLst>
+                    <a:glow rad="63500">
+                      <a:schemeClr val="bg1">
+                        <a:alpha val="16000"/>
+                      </a:schemeClr>
+                    </a:glow>
+                  </a:effectLst>
+                  <a:latin typeface="Product Sans" panose="020B0403030502040203" pitchFamily="34" charset="0"/>
+                </a:rPr>
+                <a:t>06</a:t>
+              </a:r>
+              <a:endParaRPr lang="en-US" b="1" spc="300" dirty="0">
+                <a:effectLst>
+                  <a:glow rad="63500">
+                    <a:schemeClr val="bg1">
+                      <a:alpha val="16000"/>
+                    </a:schemeClr>
+                  </a:glow>
+                </a:effectLst>
+                <a:latin typeface="Product Sans" panose="020B0403030502040203" pitchFamily="34" charset="0"/>
+              </a:endParaRPr>
+            </a:p>
+          </p:txBody>
+        </p:sp>
+        <p:sp>
+          <p:nvSpPr>
+            <p:cNvPr id="50" name="TextBox 49">
+              <a:extLst>
+                <a:ext uri="{FF2B5EF4-FFF2-40B4-BE49-F238E27FC236}">
+                  <a16:creationId xmlns:a16="http://schemas.microsoft.com/office/drawing/2014/main" id="{A38D4F43-A4F6-458C-A271-67C8FA8E96A5}"/>
+                </a:ext>
+              </a:extLst>
+            </p:cNvPr>
+            <p:cNvSpPr txBox="1"/>
+            <p:nvPr/>
+          </p:nvSpPr>
+          <p:spPr>
+            <a:xfrm>
+              <a:off x="1336808" y="5252779"/>
+              <a:ext cx="3472486" cy="923330"/>
             </a:xfrm>
             <a:prstGeom prst="rect">
               <a:avLst/>
@@ -5150,114 +5503,48 @@
                   </a:effectLst>
                   <a:latin typeface="Montserrat" panose="00000500000000000000" pitchFamily="50" charset="0"/>
                 </a:rPr>
-                <a:t>Stream money directly to your creators, monetizing every second.</a:t>
+                <a:t>Import your content</a:t>
+              </a:r>
+            </a:p>
+            <a:p>
+              <a:r>
+                <a:rPr lang="en-US" b="1" dirty="0">
+                  <a:solidFill>
+                    <a:schemeClr val="bg1"/>
+                  </a:solidFill>
+                  <a:effectLst>
+                    <a:glow rad="63500">
+                      <a:schemeClr val="bg1">
+                        <a:alpha val="16000"/>
+                      </a:schemeClr>
+                    </a:glow>
+                  </a:effectLst>
+                  <a:latin typeface="Montserrat" panose="00000500000000000000" pitchFamily="50" charset="0"/>
+                </a:rPr>
+                <a:t>from services like</a:t>
+              </a:r>
+            </a:p>
+            <a:p>
+              <a:r>
+                <a:rPr lang="en-US" b="1" dirty="0">
+                  <a:solidFill>
+                    <a:schemeClr val="bg1"/>
+                  </a:solidFill>
+                  <a:effectLst>
+                    <a:glow rad="63500">
+                      <a:schemeClr val="bg1">
+                        <a:alpha val="16000"/>
+                      </a:schemeClr>
+                    </a:glow>
+                  </a:effectLst>
+                  <a:latin typeface="Montserrat" panose="00000500000000000000" pitchFamily="50" charset="0"/>
+                </a:rPr>
+                <a:t>Medium seamlessly.</a:t>
               </a:r>
             </a:p>
           </p:txBody>
         </p:sp>
       </p:grpSp>
-      <p:pic>
-        <p:nvPicPr>
-          <p:cNvPr id="19" name="Picture 18">
-            <a:extLst>
-              <a:ext uri="{FF2B5EF4-FFF2-40B4-BE49-F238E27FC236}">
-                <a16:creationId xmlns:a16="http://schemas.microsoft.com/office/drawing/2014/main" id="{EDB8BCE2-B0A9-4E06-97DD-B577B41E9853}"/>
-              </a:ext>
-            </a:extLst>
-          </p:cNvPr>
-          <p:cNvPicPr>
-            <a:picLocks noChangeAspect="1"/>
-          </p:cNvPicPr>
-          <p:nvPr/>
-        </p:nvPicPr>
-        <p:blipFill rotWithShape="1">
-          <a:blip r:embed="rId8"/>
-          <a:srcRect l="7141" t="24039" r="7909" b="13810"/>
-          <a:stretch/>
-        </p:blipFill>
-        <p:spPr>
-          <a:xfrm>
-            <a:off x="8103537" y="4089869"/>
-            <a:ext cx="4010412" cy="2849768"/>
-          </a:xfrm>
-          <a:prstGeom prst="rect">
-            <a:avLst/>
-          </a:prstGeom>
-        </p:spPr>
-      </p:pic>
-      <p:pic>
-        <p:nvPicPr>
-          <p:cNvPr id="21" name="Picture 20" descr="A picture containing drawing&#10;&#10;Description automatically generated">
-            <a:extLst>
-              <a:ext uri="{FF2B5EF4-FFF2-40B4-BE49-F238E27FC236}">
-                <a16:creationId xmlns:a16="http://schemas.microsoft.com/office/drawing/2014/main" id="{5060EB76-3703-412E-96FD-ADC9CCCD7558}"/>
-              </a:ext>
-            </a:extLst>
-          </p:cNvPr>
-          <p:cNvPicPr>
-            <a:picLocks noChangeAspect="1"/>
-          </p:cNvPicPr>
-          <p:nvPr/>
-        </p:nvPicPr>
-        <p:blipFill>
-          <a:blip r:embed="rId9">
-            <a:extLst>
-              <a:ext uri="{28A0092B-C50C-407E-A947-70E740481C1C}">
-                <a14:useLocalDpi xmlns:a14="http://schemas.microsoft.com/office/drawing/2010/main" val="0"/>
-              </a:ext>
-            </a:extLst>
-          </a:blip>
-          <a:stretch>
-            <a:fillRect/>
-          </a:stretch>
-        </p:blipFill>
-        <p:spPr>
-          <a:xfrm>
-            <a:off x="672689" y="334732"/>
-            <a:ext cx="538215" cy="538215"/>
-          </a:xfrm>
-          <a:prstGeom prst="rect">
-            <a:avLst/>
-          </a:prstGeom>
-        </p:spPr>
-      </p:pic>
-      <p:pic>
-        <p:nvPicPr>
-          <p:cNvPr id="22" name="Picture 21" descr="A picture containing drawing&#10;&#10;Description automatically generated">
-            <a:extLst>
-              <a:ext uri="{FF2B5EF4-FFF2-40B4-BE49-F238E27FC236}">
-                <a16:creationId xmlns:a16="http://schemas.microsoft.com/office/drawing/2014/main" id="{207F00AE-E537-46D2-B79B-2B5CEE13CA49}"/>
-              </a:ext>
-            </a:extLst>
-          </p:cNvPr>
-          <p:cNvPicPr>
-            <a:picLocks noChangeAspect="1"/>
-          </p:cNvPicPr>
-          <p:nvPr/>
-        </p:nvPicPr>
-        <p:blipFill>
-          <a:blip r:embed="rId9">
-            <a:alphaModFix amt="5000"/>
-            <a:extLst>
-              <a:ext uri="{28A0092B-C50C-407E-A947-70E740481C1C}">
-                <a14:useLocalDpi xmlns:a14="http://schemas.microsoft.com/office/drawing/2010/main" val="0"/>
-              </a:ext>
-            </a:extLst>
-          </a:blip>
-          <a:stretch>
-            <a:fillRect/>
-          </a:stretch>
-        </p:blipFill>
-        <p:spPr>
-          <a:xfrm>
-            <a:off x="21665" y="-409807"/>
-            <a:ext cx="2188938" cy="2188938"/>
-          </a:xfrm>
-          <a:prstGeom prst="rect">
-            <a:avLst/>
-          </a:prstGeom>
-        </p:spPr>
-      </p:pic>
     </p:spTree>
     <p:extLst>
       <p:ext uri="{BB962C8B-B14F-4D97-AF65-F5344CB8AC3E}">

</xml_diff>